<commit_message>
more work on presentations
</commit_message>
<xml_diff>
--- a/Weekly Presentations/Week 10.pptx
+++ b/Weekly Presentations/Week 10.pptx
@@ -108,6 +108,11 @@
       </a:defRPr>
     </a:lvl9pPr>
   </p:defaultTextStyle>
+  <p:extLst>
+    <p:ext uri="{EFAFB233-063F-42B5-8137-9DF3F51BA10A}">
+      <p15:sldGuideLst xmlns:p15="http://schemas.microsoft.com/office/powerpoint/2012/main"/>
+    </p:ext>
+  </p:extLst>
 </p:presentation>
 </file>
 
@@ -258,7 +263,7 @@
           <a:p>
             <a:fld id="{F2510DFC-B1D6-F843-8452-E0302753CE01}" type="datetimeFigureOut">
               <a:rPr lang="en-US" smtClean="0"/>
-              <a:t>11/5/20</a:t>
+              <a:t>11/12/20</a:t>
             </a:fld>
             <a:endParaRPr lang="en-US"/>
           </a:p>
@@ -456,7 +461,7 @@
           <a:p>
             <a:fld id="{F2510DFC-B1D6-F843-8452-E0302753CE01}" type="datetimeFigureOut">
               <a:rPr lang="en-US" smtClean="0"/>
-              <a:t>11/5/20</a:t>
+              <a:t>11/12/20</a:t>
             </a:fld>
             <a:endParaRPr lang="en-US"/>
           </a:p>
@@ -664,7 +669,7 @@
           <a:p>
             <a:fld id="{F2510DFC-B1D6-F843-8452-E0302753CE01}" type="datetimeFigureOut">
               <a:rPr lang="en-US" smtClean="0"/>
-              <a:t>11/5/20</a:t>
+              <a:t>11/12/20</a:t>
             </a:fld>
             <a:endParaRPr lang="en-US"/>
           </a:p>
@@ -862,7 +867,7 @@
           <a:p>
             <a:fld id="{F2510DFC-B1D6-F843-8452-E0302753CE01}" type="datetimeFigureOut">
               <a:rPr lang="en-US" smtClean="0"/>
-              <a:t>11/5/20</a:t>
+              <a:t>11/12/20</a:t>
             </a:fld>
             <a:endParaRPr lang="en-US"/>
           </a:p>
@@ -1137,7 +1142,7 @@
           <a:p>
             <a:fld id="{F2510DFC-B1D6-F843-8452-E0302753CE01}" type="datetimeFigureOut">
               <a:rPr lang="en-US" smtClean="0"/>
-              <a:t>11/5/20</a:t>
+              <a:t>11/12/20</a:t>
             </a:fld>
             <a:endParaRPr lang="en-US"/>
           </a:p>
@@ -1402,7 +1407,7 @@
           <a:p>
             <a:fld id="{F2510DFC-B1D6-F843-8452-E0302753CE01}" type="datetimeFigureOut">
               <a:rPr lang="en-US" smtClean="0"/>
-              <a:t>11/5/20</a:t>
+              <a:t>11/12/20</a:t>
             </a:fld>
             <a:endParaRPr lang="en-US"/>
           </a:p>
@@ -1814,7 +1819,7 @@
           <a:p>
             <a:fld id="{F2510DFC-B1D6-F843-8452-E0302753CE01}" type="datetimeFigureOut">
               <a:rPr lang="en-US" smtClean="0"/>
-              <a:t>11/5/20</a:t>
+              <a:t>11/12/20</a:t>
             </a:fld>
             <a:endParaRPr lang="en-US"/>
           </a:p>
@@ -1955,7 +1960,7 @@
           <a:p>
             <a:fld id="{F2510DFC-B1D6-F843-8452-E0302753CE01}" type="datetimeFigureOut">
               <a:rPr lang="en-US" smtClean="0"/>
-              <a:t>11/5/20</a:t>
+              <a:t>11/12/20</a:t>
             </a:fld>
             <a:endParaRPr lang="en-US"/>
           </a:p>
@@ -2068,7 +2073,7 @@
           <a:p>
             <a:fld id="{F2510DFC-B1D6-F843-8452-E0302753CE01}" type="datetimeFigureOut">
               <a:rPr lang="en-US" smtClean="0"/>
-              <a:t>11/5/20</a:t>
+              <a:t>11/12/20</a:t>
             </a:fld>
             <a:endParaRPr lang="en-US"/>
           </a:p>
@@ -2379,7 +2384,7 @@
           <a:p>
             <a:fld id="{F2510DFC-B1D6-F843-8452-E0302753CE01}" type="datetimeFigureOut">
               <a:rPr lang="en-US" smtClean="0"/>
-              <a:t>11/5/20</a:t>
+              <a:t>11/12/20</a:t>
             </a:fld>
             <a:endParaRPr lang="en-US"/>
           </a:p>
@@ -2667,7 +2672,7 @@
           <a:p>
             <a:fld id="{F2510DFC-B1D6-F843-8452-E0302753CE01}" type="datetimeFigureOut">
               <a:rPr lang="en-US" smtClean="0"/>
-              <a:t>11/5/20</a:t>
+              <a:t>11/12/20</a:t>
             </a:fld>
             <a:endParaRPr lang="en-US"/>
           </a:p>
@@ -2908,7 +2913,7 @@
           <a:p>
             <a:fld id="{F2510DFC-B1D6-F843-8452-E0302753CE01}" type="datetimeFigureOut">
               <a:rPr lang="en-US" smtClean="0"/>
-              <a:t>11/5/20</a:t>
+              <a:t>11/12/20</a:t>
             </a:fld>
             <a:endParaRPr lang="en-US"/>
           </a:p>
@@ -3578,7 +3583,7 @@
         </p:blipFill>
         <p:spPr>
           <a:xfrm>
-            <a:off x="6096000" y="2171700"/>
+            <a:off x="6096000" y="2135124"/>
             <a:ext cx="5340350" cy="4005263"/>
           </a:xfrm>
           <a:prstGeom prst="rect">

</xml_diff>